<commit_message>
reset to 15f6cc5, recover from lecture mp4
</commit_message>
<xml_diff>
--- a/docs/lectures/lecture2.pptx
+++ b/docs/lectures/lecture2.pptx
@@ -319,7 +319,7 @@
           <a:p>
             <a:fld id="{88225CEC-B4DB-421E-BD7D-F5D0F79EA658}" type="datetimeFigureOut">
               <a:rPr lang="en-US" smtClean="0"/>
-              <a:t>3/7/2021</a:t>
+              <a:t>3/8/2021</a:t>
             </a:fld>
             <a:endParaRPr lang="en-US"/>
           </a:p>
@@ -849,7 +849,7 @@
           <a:p>
             <a:fld id="{2F895662-E2E6-47BC-B493-3EA4FCF734B6}" type="datetime1">
               <a:rPr lang="en-US" smtClean="0"/>
-              <a:t>3/7/2021</a:t>
+              <a:t>3/8/2021</a:t>
             </a:fld>
             <a:endParaRPr lang="en-US"/>
           </a:p>
@@ -1017,7 +1017,7 @@
           <a:p>
             <a:fld id="{0F4BFD65-5602-4172-B54C-6A65165A1845}" type="datetime1">
               <a:rPr lang="en-US" smtClean="0"/>
-              <a:t>3/7/2021</a:t>
+              <a:t>3/8/2021</a:t>
             </a:fld>
             <a:endParaRPr lang="en-US"/>
           </a:p>
@@ -1195,7 +1195,7 @@
           <a:p>
             <a:fld id="{6CA290DE-8138-4626-BC3F-DF68A3BD09D8}" type="datetime1">
               <a:rPr lang="en-US" smtClean="0"/>
-              <a:t>3/7/2021</a:t>
+              <a:t>3/8/2021</a:t>
             </a:fld>
             <a:endParaRPr lang="en-US"/>
           </a:p>
@@ -1363,7 +1363,7 @@
           <a:p>
             <a:fld id="{E1BE8E3F-75DF-45E8-9F6B-4F2E22494A32}" type="datetime1">
               <a:rPr lang="en-US" smtClean="0"/>
-              <a:t>3/7/2021</a:t>
+              <a:t>3/8/2021</a:t>
             </a:fld>
             <a:endParaRPr lang="en-US"/>
           </a:p>
@@ -1608,7 +1608,7 @@
           <a:p>
             <a:fld id="{82F4DA82-3E7C-4CFB-A30B-53D3893EF32E}" type="datetime1">
               <a:rPr lang="en-US" smtClean="0"/>
-              <a:t>3/7/2021</a:t>
+              <a:t>3/8/2021</a:t>
             </a:fld>
             <a:endParaRPr lang="en-US"/>
           </a:p>
@@ -1893,7 +1893,7 @@
           <a:p>
             <a:fld id="{36B3D8AD-4C83-4D73-AEE7-5E801ED5356C}" type="datetime1">
               <a:rPr lang="en-US" smtClean="0"/>
-              <a:t>3/7/2021</a:t>
+              <a:t>3/8/2021</a:t>
             </a:fld>
             <a:endParaRPr lang="en-US"/>
           </a:p>
@@ -2312,7 +2312,7 @@
           <a:p>
             <a:fld id="{7E6893DB-DD64-49D6-A5C2-F6ACE2B1530B}" type="datetime1">
               <a:rPr lang="en-US" smtClean="0"/>
-              <a:t>3/7/2021</a:t>
+              <a:t>3/8/2021</a:t>
             </a:fld>
             <a:endParaRPr lang="en-US"/>
           </a:p>
@@ -2429,7 +2429,7 @@
           <a:p>
             <a:fld id="{FC0A94C3-7A0F-4E28-9A06-985C13FFBB01}" type="datetime1">
               <a:rPr lang="en-US" smtClean="0"/>
-              <a:t>3/7/2021</a:t>
+              <a:t>3/8/2021</a:t>
             </a:fld>
             <a:endParaRPr lang="en-US"/>
           </a:p>
@@ -2524,7 +2524,7 @@
           <a:p>
             <a:fld id="{8587B2D3-0011-41C0-B2C5-6B713844DB1C}" type="datetime1">
               <a:rPr lang="en-US" smtClean="0"/>
-              <a:t>3/7/2021</a:t>
+              <a:t>3/8/2021</a:t>
             </a:fld>
             <a:endParaRPr lang="en-US"/>
           </a:p>
@@ -2799,7 +2799,7 @@
           <a:p>
             <a:fld id="{B53EE19A-9EFD-417C-93CE-FC2F485F3533}" type="datetime1">
               <a:rPr lang="en-US" smtClean="0"/>
-              <a:t>3/7/2021</a:t>
+              <a:t>3/8/2021</a:t>
             </a:fld>
             <a:endParaRPr lang="en-US"/>
           </a:p>
@@ -3054,7 +3054,7 @@
           <a:p>
             <a:fld id="{87D9954C-8CD1-4968-8DFE-C7948C62F830}" type="datetime1">
               <a:rPr lang="en-US" smtClean="0"/>
-              <a:t>3/7/2021</a:t>
+              <a:t>3/8/2021</a:t>
             </a:fld>
             <a:endParaRPr lang="en-US"/>
           </a:p>
@@ -3270,7 +3270,7 @@
           <a:p>
             <a:fld id="{B4BF092D-FE75-4F27-B0C3-A897761F708C}" type="datetime1">
               <a:rPr lang="en-US" smtClean="0"/>
-              <a:t>3/7/2021</a:t>
+              <a:t>3/8/2021</a:t>
             </a:fld>
             <a:endParaRPr lang="en-US"/>
           </a:p>
@@ -3941,127 +3941,6 @@
   <p:clrMapOvr>
     <a:masterClrMapping/>
   </p:clrMapOvr>
-  <p:timing>
-    <p:tnLst>
-      <p:par>
-        <p:cTn id="1" dur="indefinite" restart="never" nodeType="tmRoot">
-          <p:childTnLst>
-            <p:seq concurrent="1" nextAc="seek">
-              <p:cTn id="2" dur="indefinite" nodeType="mainSeq">
-                <p:childTnLst>
-                  <p:par>
-                    <p:cTn id="3" fill="hold">
-                      <p:stCondLst>
-                        <p:cond delay="indefinite"/>
-                      </p:stCondLst>
-                      <p:childTnLst>
-                        <p:par>
-                          <p:cTn id="4" fill="hold">
-                            <p:stCondLst>
-                              <p:cond delay="0"/>
-                            </p:stCondLst>
-                            <p:childTnLst>
-                              <p:par>
-                                <p:cTn id="5" presetID="2" presetClass="entr" presetSubtype="8" fill="hold" nodeType="clickEffect">
-                                  <p:stCondLst>
-                                    <p:cond delay="0"/>
-                                  </p:stCondLst>
-                                  <p:childTnLst>
-                                    <p:set>
-                                      <p:cBhvr>
-                                        <p:cTn id="6" dur="1" fill="hold">
-                                          <p:stCondLst>
-                                            <p:cond delay="0"/>
-                                          </p:stCondLst>
-                                        </p:cTn>
-                                        <p:tgtEl>
-                                          <p:spTgt spid="4"/>
-                                        </p:tgtEl>
-                                        <p:attrNameLst>
-                                          <p:attrName>style.visibility</p:attrName>
-                                        </p:attrNameLst>
-                                      </p:cBhvr>
-                                      <p:to>
-                                        <p:strVal val="visible"/>
-                                      </p:to>
-                                    </p:set>
-                                    <p:anim calcmode="lin" valueType="num">
-                                      <p:cBhvr additive="base">
-                                        <p:cTn id="7" dur="500" fill="hold"/>
-                                        <p:tgtEl>
-                                          <p:spTgt spid="4"/>
-                                        </p:tgtEl>
-                                        <p:attrNameLst>
-                                          <p:attrName>ppt_x</p:attrName>
-                                        </p:attrNameLst>
-                                      </p:cBhvr>
-                                      <p:tavLst>
-                                        <p:tav tm="0">
-                                          <p:val>
-                                            <p:strVal val="0-#ppt_w/2"/>
-                                          </p:val>
-                                        </p:tav>
-                                        <p:tav tm="100000">
-                                          <p:val>
-                                            <p:strVal val="#ppt_x"/>
-                                          </p:val>
-                                        </p:tav>
-                                      </p:tavLst>
-                                    </p:anim>
-                                    <p:anim calcmode="lin" valueType="num">
-                                      <p:cBhvr additive="base">
-                                        <p:cTn id="8" dur="500" fill="hold"/>
-                                        <p:tgtEl>
-                                          <p:spTgt spid="4"/>
-                                        </p:tgtEl>
-                                        <p:attrNameLst>
-                                          <p:attrName>ppt_y</p:attrName>
-                                        </p:attrNameLst>
-                                      </p:cBhvr>
-                                      <p:tavLst>
-                                        <p:tav tm="0">
-                                          <p:val>
-                                            <p:strVal val="#ppt_y"/>
-                                          </p:val>
-                                        </p:tav>
-                                        <p:tav tm="100000">
-                                          <p:val>
-                                            <p:strVal val="#ppt_y"/>
-                                          </p:val>
-                                        </p:tav>
-                                      </p:tavLst>
-                                    </p:anim>
-                                  </p:childTnLst>
-                                </p:cTn>
-                              </p:par>
-                            </p:childTnLst>
-                          </p:cTn>
-                        </p:par>
-                      </p:childTnLst>
-                    </p:cTn>
-                  </p:par>
-                </p:childTnLst>
-              </p:cTn>
-              <p:prevCondLst>
-                <p:cond evt="onPrev" delay="0">
-                  <p:tgtEl>
-                    <p:sldTgt/>
-                  </p:tgtEl>
-                </p:cond>
-              </p:prevCondLst>
-              <p:nextCondLst>
-                <p:cond evt="onNext" delay="0">
-                  <p:tgtEl>
-                    <p:sldTgt/>
-                  </p:tgtEl>
-                </p:cond>
-              </p:nextCondLst>
-            </p:seq>
-          </p:childTnLst>
-        </p:cTn>
-      </p:par>
-    </p:tnLst>
-  </p:timing>
 </p:sld>
 </file>
 
@@ -4304,7 +4183,7 @@
           <a:graphicData uri="http://schemas.openxmlformats.org/presentationml/2006/ole">
             <mc:AlternateContent xmlns:mc="http://schemas.openxmlformats.org/markup-compatibility/2006">
               <mc:Choice xmlns:v="urn:schemas-microsoft-com:vml" Requires="v">
-                <p:oleObj spid="_x0000_s3280" name="Equation" r:id="rId3" imgW="139680" imgH="203040" progId="Equation.DSMT4">
+                <p:oleObj spid="_x0000_s3296" name="Equation" r:id="rId3" imgW="139680" imgH="203040" progId="Equation.DSMT4">
                   <p:embed/>
                 </p:oleObj>
               </mc:Choice>
@@ -4361,7 +4240,7 @@
           <a:graphicData uri="http://schemas.openxmlformats.org/presentationml/2006/ole">
             <mc:AlternateContent xmlns:mc="http://schemas.openxmlformats.org/markup-compatibility/2006">
               <mc:Choice xmlns:v="urn:schemas-microsoft-com:vml" Requires="v">
-                <p:oleObj spid="_x0000_s3281" name="Equation" r:id="rId5" imgW="2450880" imgH="253800" progId="Equation.DSMT4">
+                <p:oleObj spid="_x0000_s3297" name="Equation" r:id="rId5" imgW="2450880" imgH="253800" progId="Equation.DSMT4">
                   <p:embed/>
                 </p:oleObj>
               </mc:Choice>
@@ -4418,7 +4297,7 @@
           <a:graphicData uri="http://schemas.openxmlformats.org/presentationml/2006/ole">
             <mc:AlternateContent xmlns:mc="http://schemas.openxmlformats.org/markup-compatibility/2006">
               <mc:Choice xmlns:v="urn:schemas-microsoft-com:vml" Requires="v">
-                <p:oleObj spid="_x0000_s3282" name="Equation" r:id="rId7" imgW="164880" imgH="228600" progId="Equation.DSMT4">
+                <p:oleObj spid="_x0000_s3298" name="Equation" r:id="rId7" imgW="164880" imgH="228600" progId="Equation.DSMT4">
                   <p:embed/>
                 </p:oleObj>
               </mc:Choice>
@@ -4555,7 +4434,7 @@
           <a:graphicData uri="http://schemas.openxmlformats.org/presentationml/2006/ole">
             <mc:AlternateContent xmlns:mc="http://schemas.openxmlformats.org/markup-compatibility/2006">
               <mc:Choice xmlns:v="urn:schemas-microsoft-com:vml" Requires="v">
-                <p:oleObj spid="_x0000_s3283" name="Equation" r:id="rId3" imgW="139680" imgH="203040" progId="Equation.DSMT4">
+                <p:oleObj spid="_x0000_s3299" name="Equation" r:id="rId3" imgW="139680" imgH="203040" progId="Equation.DSMT4">
                   <p:embed/>
                 </p:oleObj>
               </mc:Choice>
@@ -4909,6 +4788,198 @@
   <p:clrMapOvr>
     <a:masterClrMapping/>
   </p:clrMapOvr>
+  <p:timing>
+    <p:tnLst>
+      <p:par>
+        <p:cTn id="1" dur="indefinite" restart="never" nodeType="tmRoot">
+          <p:childTnLst>
+            <p:seq concurrent="1" nextAc="seek">
+              <p:cTn id="2" dur="indefinite" nodeType="mainSeq">
+                <p:childTnLst>
+                  <p:par>
+                    <p:cTn id="3" fill="hold">
+                      <p:stCondLst>
+                        <p:cond delay="indefinite"/>
+                      </p:stCondLst>
+                      <p:childTnLst>
+                        <p:par>
+                          <p:cTn id="4" fill="hold">
+                            <p:stCondLst>
+                              <p:cond delay="0"/>
+                            </p:stCondLst>
+                            <p:childTnLst>
+                              <p:par>
+                                <p:cTn id="5" presetID="1" presetClass="entr" presetSubtype="0" fill="hold" nodeType="clickEffect">
+                                  <p:stCondLst>
+                                    <p:cond delay="0"/>
+                                  </p:stCondLst>
+                                  <p:childTnLst>
+                                    <p:set>
+                                      <p:cBhvr>
+                                        <p:cTn id="6" dur="1" fill="hold">
+                                          <p:stCondLst>
+                                            <p:cond delay="0"/>
+                                          </p:stCondLst>
+                                        </p:cTn>
+                                        <p:tgtEl>
+                                          <p:spTgt spid="3">
+                                            <p:txEl>
+                                              <p:pRg st="2" end="2"/>
+                                            </p:txEl>
+                                          </p:spTgt>
+                                        </p:tgtEl>
+                                        <p:attrNameLst>
+                                          <p:attrName>style.visibility</p:attrName>
+                                        </p:attrNameLst>
+                                      </p:cBhvr>
+                                      <p:to>
+                                        <p:strVal val="visible"/>
+                                      </p:to>
+                                    </p:set>
+                                  </p:childTnLst>
+                                </p:cTn>
+                              </p:par>
+                              <p:par>
+                                <p:cTn id="7" presetID="1" presetClass="entr" presetSubtype="0" fill="hold" grpId="0" nodeType="withEffect">
+                                  <p:stCondLst>
+                                    <p:cond delay="0"/>
+                                  </p:stCondLst>
+                                  <p:childTnLst>
+                                    <p:set>
+                                      <p:cBhvr>
+                                        <p:cTn id="8" dur="1" fill="hold">
+                                          <p:stCondLst>
+                                            <p:cond delay="0"/>
+                                          </p:stCondLst>
+                                        </p:cTn>
+                                        <p:tgtEl>
+                                          <p:spTgt spid="7"/>
+                                        </p:tgtEl>
+                                        <p:attrNameLst>
+                                          <p:attrName>style.visibility</p:attrName>
+                                        </p:attrNameLst>
+                                      </p:cBhvr>
+                                      <p:to>
+                                        <p:strVal val="visible"/>
+                                      </p:to>
+                                    </p:set>
+                                  </p:childTnLst>
+                                </p:cTn>
+                              </p:par>
+                            </p:childTnLst>
+                          </p:cTn>
+                        </p:par>
+                        <p:par>
+                          <p:cTn id="9" fill="hold">
+                            <p:stCondLst>
+                              <p:cond delay="0"/>
+                            </p:stCondLst>
+                            <p:childTnLst>
+                              <p:par>
+                                <p:cTn id="10" presetID="2" presetClass="entr" presetSubtype="2" fill="hold" grpId="0" nodeType="afterEffect">
+                                  <p:stCondLst>
+                                    <p:cond delay="1000"/>
+                                  </p:stCondLst>
+                                  <p:childTnLst>
+                                    <p:set>
+                                      <p:cBhvr>
+                                        <p:cTn id="11" dur="1" fill="hold">
+                                          <p:stCondLst>
+                                            <p:cond delay="0"/>
+                                          </p:stCondLst>
+                                        </p:cTn>
+                                        <p:tgtEl>
+                                          <p:spTgt spid="6"/>
+                                        </p:tgtEl>
+                                        <p:attrNameLst>
+                                          <p:attrName>style.visibility</p:attrName>
+                                        </p:attrNameLst>
+                                      </p:cBhvr>
+                                      <p:to>
+                                        <p:strVal val="visible"/>
+                                      </p:to>
+                                    </p:set>
+                                    <p:anim calcmode="lin" valueType="num">
+                                      <p:cBhvr additive="base">
+                                        <p:cTn id="12" dur="500" fill="hold"/>
+                                        <p:tgtEl>
+                                          <p:spTgt spid="6"/>
+                                        </p:tgtEl>
+                                        <p:attrNameLst>
+                                          <p:attrName>ppt_x</p:attrName>
+                                        </p:attrNameLst>
+                                      </p:cBhvr>
+                                      <p:tavLst>
+                                        <p:tav tm="0">
+                                          <p:val>
+                                            <p:strVal val="1+#ppt_w/2"/>
+                                          </p:val>
+                                        </p:tav>
+                                        <p:tav tm="100000">
+                                          <p:val>
+                                            <p:strVal val="#ppt_x"/>
+                                          </p:val>
+                                        </p:tav>
+                                      </p:tavLst>
+                                    </p:anim>
+                                    <p:anim calcmode="lin" valueType="num">
+                                      <p:cBhvr additive="base">
+                                        <p:cTn id="13" dur="500" fill="hold"/>
+                                        <p:tgtEl>
+                                          <p:spTgt spid="6"/>
+                                        </p:tgtEl>
+                                        <p:attrNameLst>
+                                          <p:attrName>ppt_y</p:attrName>
+                                        </p:attrNameLst>
+                                      </p:cBhvr>
+                                      <p:tavLst>
+                                        <p:tav tm="0">
+                                          <p:val>
+                                            <p:strVal val="#ppt_y"/>
+                                          </p:val>
+                                        </p:tav>
+                                        <p:tav tm="100000">
+                                          <p:val>
+                                            <p:strVal val="#ppt_y"/>
+                                          </p:val>
+                                        </p:tav>
+                                      </p:tavLst>
+                                    </p:anim>
+                                  </p:childTnLst>
+                                </p:cTn>
+                              </p:par>
+                            </p:childTnLst>
+                          </p:cTn>
+                        </p:par>
+                      </p:childTnLst>
+                    </p:cTn>
+                  </p:par>
+                </p:childTnLst>
+              </p:cTn>
+              <p:prevCondLst>
+                <p:cond evt="onPrev" delay="0">
+                  <p:tgtEl>
+                    <p:sldTgt/>
+                  </p:tgtEl>
+                </p:cond>
+              </p:prevCondLst>
+              <p:nextCondLst>
+                <p:cond evt="onNext" delay="0">
+                  <p:tgtEl>
+                    <p:sldTgt/>
+                  </p:tgtEl>
+                </p:cond>
+              </p:nextCondLst>
+            </p:seq>
+          </p:childTnLst>
+        </p:cTn>
+      </p:par>
+    </p:tnLst>
+    <p:bldLst>
+      <p:bldP spid="6" grpId="0"/>
+      <p:bldP spid="7" grpId="0" animBg="1"/>
+    </p:bldLst>
+  </p:timing>
 </p:sld>
 </file>
 
@@ -6018,298 +6089,6 @@
       </p:sp>
       <p:sp>
         <p:nvSpPr>
-          <p:cNvPr id="5" name="TextBox 4"/>
-          <p:cNvSpPr txBox="1"/>
-          <p:nvPr/>
-        </p:nvSpPr>
-        <p:spPr>
-          <a:xfrm>
-            <a:off x="533400" y="1828800"/>
-            <a:ext cx="3886200" cy="1384995"/>
-          </a:xfrm>
-          <a:prstGeom prst="rect">
-            <a:avLst/>
-          </a:prstGeom>
-          <a:solidFill>
-            <a:srgbClr val="FFFF00">
-              <a:alpha val="10000"/>
-            </a:srgbClr>
-          </a:solidFill>
-        </p:spPr>
-        <p:txBody>
-          <a:bodyPr wrap="square" rtlCol="0">
-            <a:spAutoFit/>
-          </a:bodyPr>
-          <a:lstStyle/>
-          <a:p>
-            <a:r>
-              <a:rPr lang="en-US" sz="1200" dirty="0">
-                <a:latin typeface="Lucida Sans Typewriter" pitchFamily="49" charset="0"/>
-              </a:rPr>
-              <a:t>&gt; </a:t>
-            </a:r>
-            <a:r>
-              <a:rPr lang="en-US" sz="1200" dirty="0" err="1">
-                <a:latin typeface="Lucida Sans Typewriter" pitchFamily="49" charset="0"/>
-              </a:rPr>
-              <a:t>Anova</a:t>
-            </a:r>
-            <a:r>
-              <a:rPr lang="en-US" sz="1200" dirty="0">
-                <a:latin typeface="Lucida Sans Typewriter" pitchFamily="49" charset="0"/>
-              </a:rPr>
-              <a:t>(lm(BM ~ group, data=</a:t>
-            </a:r>
-            <a:r>
-              <a:rPr lang="en-US" sz="1200" dirty="0" err="1">
-                <a:latin typeface="Lucida Sans Typewriter" pitchFamily="49" charset="0"/>
-              </a:rPr>
-              <a:t>mathscore</a:t>
-            </a:r>
-            <a:r>
-              <a:rPr lang="en-US" sz="1200" dirty="0">
-                <a:latin typeface="Lucida Sans Typewriter" pitchFamily="49" charset="0"/>
-              </a:rPr>
-              <a:t>))</a:t>
-            </a:r>
-          </a:p>
-          <a:p>
-            <a:r>
-              <a:rPr lang="en-US" sz="1200" dirty="0" err="1">
-                <a:latin typeface="Lucida Sans Typewriter" pitchFamily="49" charset="0"/>
-              </a:rPr>
-              <a:t>Anova</a:t>
-            </a:r>
-            <a:r>
-              <a:rPr lang="en-US" sz="1200" dirty="0">
-                <a:latin typeface="Lucida Sans Typewriter" pitchFamily="49" charset="0"/>
-              </a:rPr>
-              <a:t> Table (Type II tests)</a:t>
-            </a:r>
-          </a:p>
-          <a:p>
-            <a:endParaRPr lang="en-US" sz="1200" dirty="0">
-              <a:latin typeface="Lucida Sans Typewriter" pitchFamily="49" charset="0"/>
-            </a:endParaRPr>
-          </a:p>
-          <a:p>
-            <a:r>
-              <a:rPr lang="en-US" sz="1200" dirty="0">
-                <a:latin typeface="Lucida Sans Typewriter" pitchFamily="49" charset="0"/>
-              </a:rPr>
-              <a:t>Response: BM</a:t>
-            </a:r>
-          </a:p>
-          <a:p>
-            <a:r>
-              <a:rPr lang="en-US" sz="1200" dirty="0">
-                <a:latin typeface="Lucida Sans Typewriter" pitchFamily="49" charset="0"/>
-              </a:rPr>
-              <a:t>          Sum </a:t>
-            </a:r>
-            <a:r>
-              <a:rPr lang="en-US" sz="1200" dirty="0" err="1">
-                <a:latin typeface="Lucida Sans Typewriter" pitchFamily="49" charset="0"/>
-              </a:rPr>
-              <a:t>Sq</a:t>
-            </a:r>
-            <a:r>
-              <a:rPr lang="en-US" sz="1200" dirty="0">
-                <a:latin typeface="Lucida Sans Typewriter" pitchFamily="49" charset="0"/>
-              </a:rPr>
-              <a:t> </a:t>
-            </a:r>
-            <a:r>
-              <a:rPr lang="en-US" sz="1200" dirty="0" err="1">
-                <a:latin typeface="Lucida Sans Typewriter" pitchFamily="49" charset="0"/>
-              </a:rPr>
-              <a:t>Df</a:t>
-            </a:r>
-            <a:r>
-              <a:rPr lang="en-US" sz="1200" dirty="0">
-                <a:latin typeface="Lucida Sans Typewriter" pitchFamily="49" charset="0"/>
-              </a:rPr>
-              <a:t> F value </a:t>
-            </a:r>
-            <a:r>
-              <a:rPr lang="en-US" sz="1200" dirty="0" err="1">
-                <a:latin typeface="Lucida Sans Typewriter" pitchFamily="49" charset="0"/>
-              </a:rPr>
-              <a:t>Pr</a:t>
-            </a:r>
-            <a:r>
-              <a:rPr lang="en-US" sz="1200" dirty="0">
-                <a:latin typeface="Lucida Sans Typewriter" pitchFamily="49" charset="0"/>
-              </a:rPr>
-              <a:t>(&gt;F)  </a:t>
-            </a:r>
-          </a:p>
-          <a:p>
-            <a:r>
-              <a:rPr lang="en-US" sz="1200" dirty="0">
-                <a:latin typeface="Lucida Sans Typewriter" pitchFamily="49" charset="0"/>
-              </a:rPr>
-              <a:t>group       1302  1    4.24  0.066 .</a:t>
-            </a:r>
-          </a:p>
-          <a:p>
-            <a:r>
-              <a:rPr lang="en-US" sz="1200" dirty="0">
-                <a:latin typeface="Lucida Sans Typewriter" pitchFamily="49" charset="0"/>
-              </a:rPr>
-              <a:t>Residuals   3071 10 </a:t>
-            </a:r>
-          </a:p>
-        </p:txBody>
-      </p:sp>
-      <p:sp>
-        <p:nvSpPr>
-          <p:cNvPr id="6" name="TextBox 5"/>
-          <p:cNvSpPr txBox="1"/>
-          <p:nvPr/>
-        </p:nvSpPr>
-        <p:spPr>
-          <a:xfrm>
-            <a:off x="4724400" y="1828800"/>
-            <a:ext cx="3886200" cy="1384995"/>
-          </a:xfrm>
-          <a:prstGeom prst="rect">
-            <a:avLst/>
-          </a:prstGeom>
-          <a:solidFill>
-            <a:srgbClr val="FFFF00">
-              <a:alpha val="10000"/>
-            </a:srgbClr>
-          </a:solidFill>
-        </p:spPr>
-        <p:txBody>
-          <a:bodyPr wrap="square" rtlCol="0">
-            <a:spAutoFit/>
-          </a:bodyPr>
-          <a:lstStyle/>
-          <a:p>
-            <a:r>
-              <a:rPr lang="en-US" sz="1200" dirty="0">
-                <a:latin typeface="Lucida Sans Typewriter" pitchFamily="49" charset="0"/>
-              </a:rPr>
-              <a:t>&gt; </a:t>
-            </a:r>
-            <a:r>
-              <a:rPr lang="en-US" sz="1200" dirty="0" err="1">
-                <a:latin typeface="Lucida Sans Typewriter" pitchFamily="49" charset="0"/>
-              </a:rPr>
-              <a:t>Anova</a:t>
-            </a:r>
-            <a:r>
-              <a:rPr lang="en-US" sz="1200" dirty="0">
-                <a:latin typeface="Lucida Sans Typewriter" pitchFamily="49" charset="0"/>
-              </a:rPr>
-              <a:t>(lm(WP ~ group, data=</a:t>
-            </a:r>
-            <a:r>
-              <a:rPr lang="en-US" sz="1200" dirty="0" err="1">
-                <a:latin typeface="Lucida Sans Typewriter" pitchFamily="49" charset="0"/>
-              </a:rPr>
-              <a:t>mathscore</a:t>
-            </a:r>
-            <a:r>
-              <a:rPr lang="en-US" sz="1200" dirty="0">
-                <a:latin typeface="Lucida Sans Typewriter" pitchFamily="49" charset="0"/>
-              </a:rPr>
-              <a:t>))</a:t>
-            </a:r>
-          </a:p>
-          <a:p>
-            <a:r>
-              <a:rPr lang="en-US" sz="1200" dirty="0" err="1">
-                <a:latin typeface="Lucida Sans Typewriter" pitchFamily="49" charset="0"/>
-              </a:rPr>
-              <a:t>Anova</a:t>
-            </a:r>
-            <a:r>
-              <a:rPr lang="en-US" sz="1200" dirty="0">
-                <a:latin typeface="Lucida Sans Typewriter" pitchFamily="49" charset="0"/>
-              </a:rPr>
-              <a:t> Table (Type II tests)</a:t>
-            </a:r>
-          </a:p>
-          <a:p>
-            <a:endParaRPr lang="en-US" sz="1200" dirty="0">
-              <a:latin typeface="Lucida Sans Typewriter" pitchFamily="49" charset="0"/>
-            </a:endParaRPr>
-          </a:p>
-          <a:p>
-            <a:r>
-              <a:rPr lang="en-US" sz="1200" dirty="0">
-                <a:latin typeface="Lucida Sans Typewriter" pitchFamily="49" charset="0"/>
-              </a:rPr>
-              <a:t>Response: WP</a:t>
-            </a:r>
-          </a:p>
-          <a:p>
-            <a:r>
-              <a:rPr lang="en-US" sz="1200" dirty="0">
-                <a:latin typeface="Lucida Sans Typewriter" pitchFamily="49" charset="0"/>
-              </a:rPr>
-              <a:t>          Sum </a:t>
-            </a:r>
-            <a:r>
-              <a:rPr lang="en-US" sz="1200" dirty="0" err="1">
-                <a:latin typeface="Lucida Sans Typewriter" pitchFamily="49" charset="0"/>
-              </a:rPr>
-              <a:t>Sq</a:t>
-            </a:r>
-            <a:r>
-              <a:rPr lang="en-US" sz="1200" dirty="0">
-                <a:latin typeface="Lucida Sans Typewriter" pitchFamily="49" charset="0"/>
-              </a:rPr>
-              <a:t> </a:t>
-            </a:r>
-            <a:r>
-              <a:rPr lang="en-US" sz="1200" dirty="0" err="1">
-                <a:latin typeface="Lucida Sans Typewriter" pitchFamily="49" charset="0"/>
-              </a:rPr>
-              <a:t>Df</a:t>
-            </a:r>
-            <a:r>
-              <a:rPr lang="en-US" sz="1200" dirty="0">
-                <a:latin typeface="Lucida Sans Typewriter" pitchFamily="49" charset="0"/>
-              </a:rPr>
-              <a:t> F value </a:t>
-            </a:r>
-            <a:r>
-              <a:rPr lang="en-US" sz="1200" dirty="0" err="1">
-                <a:latin typeface="Lucida Sans Typewriter" pitchFamily="49" charset="0"/>
-              </a:rPr>
-              <a:t>Pr</a:t>
-            </a:r>
-            <a:r>
-              <a:rPr lang="en-US" sz="1200" dirty="0">
-                <a:latin typeface="Lucida Sans Typewriter" pitchFamily="49" charset="0"/>
-              </a:rPr>
-              <a:t>(&gt;F)   </a:t>
-            </a:r>
-          </a:p>
-          <a:p>
-            <a:r>
-              <a:rPr lang="en-US" sz="1200" dirty="0">
-                <a:latin typeface="Lucida Sans Typewriter" pitchFamily="49" charset="0"/>
-              </a:rPr>
-              <a:t>group       4408  1    10.4  0.009 **</a:t>
-            </a:r>
-          </a:p>
-          <a:p>
-            <a:r>
-              <a:rPr lang="en-US" sz="1200" dirty="0">
-                <a:latin typeface="Lucida Sans Typewriter" pitchFamily="49" charset="0"/>
-              </a:rPr>
-              <a:t>Residuals   4217 10 </a:t>
-            </a:r>
-          </a:p>
-        </p:txBody>
-      </p:sp>
-      <p:sp>
-        <p:nvSpPr>
           <p:cNvPr id="7" name="TextBox 6"/>
           <p:cNvSpPr txBox="1"/>
           <p:nvPr/>
@@ -6395,7 +6174,7 @@
         </p:nvSpPr>
         <p:spPr>
           <a:xfrm>
-            <a:off x="533400" y="4876800"/>
+            <a:off x="533400" y="4770925"/>
             <a:ext cx="8153400" cy="1754326"/>
           </a:xfrm>
           <a:prstGeom prst="rect">
@@ -6479,82 +6258,416 @@
           </a:p>
         </p:txBody>
       </p:sp>
-      <p:sp>
-        <p:nvSpPr>
-          <p:cNvPr id="11" name="TextBox 10"/>
-          <p:cNvSpPr txBox="1"/>
+      <p:grpSp>
+        <p:nvGrpSpPr>
+          <p:cNvPr id="9" name="Group 8">
+            <a:extLst>
+              <a:ext uri="{FF2B5EF4-FFF2-40B4-BE49-F238E27FC236}">
+                <a16:creationId xmlns:a16="http://schemas.microsoft.com/office/drawing/2014/main" id="{615178CA-2CA5-4053-9F35-CBBE42D0EA2C}"/>
+              </a:ext>
+            </a:extLst>
+          </p:cNvPr>
+          <p:cNvGrpSpPr/>
           <p:nvPr/>
-        </p:nvSpPr>
-        <p:spPr>
+        </p:nvGrpSpPr>
+        <p:grpSpPr>
           <a:xfrm>
-            <a:off x="3973644" y="2544881"/>
-            <a:ext cx="445956" cy="584775"/>
+            <a:off x="533400" y="1828800"/>
+            <a:ext cx="3886200" cy="1384995"/>
+            <a:chOff x="533400" y="1828800"/>
+            <a:chExt cx="3886200" cy="1384995"/>
           </a:xfrm>
-          <a:prstGeom prst="rect">
-            <a:avLst/>
-          </a:prstGeom>
-          <a:noFill/>
-        </p:spPr>
-        <p:txBody>
-          <a:bodyPr wrap="none" rtlCol="0">
-            <a:spAutoFit/>
-          </a:bodyPr>
-          <a:lstStyle/>
-          <a:p>
-            <a:pPr algn="ctr"/>
-            <a:r>
-              <a:rPr lang="en-US" sz="3200" dirty="0">
+        </p:grpSpPr>
+        <p:sp>
+          <p:nvSpPr>
+            <p:cNvPr id="5" name="TextBox 4"/>
+            <p:cNvSpPr txBox="1"/>
+            <p:nvPr/>
+          </p:nvSpPr>
+          <p:spPr>
+            <a:xfrm>
+              <a:off x="533400" y="1828800"/>
+              <a:ext cx="3886200" cy="1384995"/>
+            </a:xfrm>
+            <a:prstGeom prst="rect">
+              <a:avLst/>
+            </a:prstGeom>
+            <a:solidFill>
+              <a:srgbClr val="FFFF00">
+                <a:alpha val="10000"/>
+              </a:srgbClr>
+            </a:solidFill>
+          </p:spPr>
+          <p:txBody>
+            <a:bodyPr wrap="square" rtlCol="0">
+              <a:spAutoFit/>
+            </a:bodyPr>
+            <a:lstStyle/>
+            <a:p>
+              <a:r>
+                <a:rPr lang="en-US" sz="1200" dirty="0">
+                  <a:latin typeface="Lucida Sans Typewriter" pitchFamily="49" charset="0"/>
+                </a:rPr>
+                <a:t>&gt; </a:t>
+              </a:r>
+              <a:r>
+                <a:rPr lang="en-US" sz="1200" dirty="0" err="1">
+                  <a:latin typeface="Lucida Sans Typewriter" pitchFamily="49" charset="0"/>
+                </a:rPr>
+                <a:t>Anova</a:t>
+              </a:r>
+              <a:r>
+                <a:rPr lang="en-US" sz="1200" dirty="0">
+                  <a:latin typeface="Lucida Sans Typewriter" pitchFamily="49" charset="0"/>
+                </a:rPr>
+                <a:t>(lm(BM ~ group, data=</a:t>
+              </a:r>
+              <a:r>
+                <a:rPr lang="en-US" sz="1200" dirty="0" err="1">
+                  <a:latin typeface="Lucida Sans Typewriter" pitchFamily="49" charset="0"/>
+                </a:rPr>
+                <a:t>mathscore</a:t>
+              </a:r>
+              <a:r>
+                <a:rPr lang="en-US" sz="1200" dirty="0">
+                  <a:latin typeface="Lucida Sans Typewriter" pitchFamily="49" charset="0"/>
+                </a:rPr>
+                <a:t>))</a:t>
+              </a:r>
+            </a:p>
+            <a:p>
+              <a:r>
+                <a:rPr lang="en-US" sz="1200" dirty="0" err="1">
+                  <a:latin typeface="Lucida Sans Typewriter" pitchFamily="49" charset="0"/>
+                </a:rPr>
+                <a:t>Anova</a:t>
+              </a:r>
+              <a:r>
+                <a:rPr lang="en-US" sz="1200" dirty="0">
+                  <a:latin typeface="Lucida Sans Typewriter" pitchFamily="49" charset="0"/>
+                </a:rPr>
+                <a:t> Table (Type II tests)</a:t>
+              </a:r>
+            </a:p>
+            <a:p>
+              <a:endParaRPr lang="en-US" sz="1200" dirty="0">
+                <a:latin typeface="Lucida Sans Typewriter" pitchFamily="49" charset="0"/>
+              </a:endParaRPr>
+            </a:p>
+            <a:p>
+              <a:r>
+                <a:rPr lang="en-US" sz="1200" dirty="0">
+                  <a:latin typeface="Lucida Sans Typewriter" pitchFamily="49" charset="0"/>
+                </a:rPr>
+                <a:t>Response: BM</a:t>
+              </a:r>
+            </a:p>
+            <a:p>
+              <a:r>
+                <a:rPr lang="en-US" sz="1200" dirty="0">
+                  <a:latin typeface="Lucida Sans Typewriter" pitchFamily="49" charset="0"/>
+                </a:rPr>
+                <a:t>          Sum </a:t>
+              </a:r>
+              <a:r>
+                <a:rPr lang="en-US" sz="1200" dirty="0" err="1">
+                  <a:latin typeface="Lucida Sans Typewriter" pitchFamily="49" charset="0"/>
+                </a:rPr>
+                <a:t>Sq</a:t>
+              </a:r>
+              <a:r>
+                <a:rPr lang="en-US" sz="1200" dirty="0">
+                  <a:latin typeface="Lucida Sans Typewriter" pitchFamily="49" charset="0"/>
+                </a:rPr>
+                <a:t> </a:t>
+              </a:r>
+              <a:r>
+                <a:rPr lang="en-US" sz="1200" dirty="0" err="1">
+                  <a:latin typeface="Lucida Sans Typewriter" pitchFamily="49" charset="0"/>
+                </a:rPr>
+                <a:t>Df</a:t>
+              </a:r>
+              <a:r>
+                <a:rPr lang="en-US" sz="1200" dirty="0">
+                  <a:latin typeface="Lucida Sans Typewriter" pitchFamily="49" charset="0"/>
+                </a:rPr>
+                <a:t> F value </a:t>
+              </a:r>
+              <a:r>
+                <a:rPr lang="en-US" sz="1200" dirty="0" err="1">
+                  <a:latin typeface="Lucida Sans Typewriter" pitchFamily="49" charset="0"/>
+                </a:rPr>
+                <a:t>Pr</a:t>
+              </a:r>
+              <a:r>
+                <a:rPr lang="en-US" sz="1200" dirty="0">
+                  <a:latin typeface="Lucida Sans Typewriter" pitchFamily="49" charset="0"/>
+                </a:rPr>
+                <a:t>(&gt;F)  </a:t>
+              </a:r>
+            </a:p>
+            <a:p>
+              <a:r>
+                <a:rPr lang="en-US" sz="1200" dirty="0">
+                  <a:latin typeface="Lucida Sans Typewriter" pitchFamily="49" charset="0"/>
+                </a:rPr>
+                <a:t>group       1302  1    4.24  0.066 .</a:t>
+              </a:r>
+            </a:p>
+            <a:p>
+              <a:r>
+                <a:rPr lang="en-US" sz="1200" dirty="0">
+                  <a:latin typeface="Lucida Sans Typewriter" pitchFamily="49" charset="0"/>
+                </a:rPr>
+                <a:t>Residuals   3071 10 </a:t>
+              </a:r>
+            </a:p>
+          </p:txBody>
+        </p:sp>
+        <p:sp>
+          <p:nvSpPr>
+            <p:cNvPr id="11" name="TextBox 10"/>
+            <p:cNvSpPr txBox="1"/>
+            <p:nvPr/>
+          </p:nvSpPr>
+          <p:spPr>
+            <a:xfrm>
+              <a:off x="3973644" y="2544881"/>
+              <a:ext cx="445956" cy="584775"/>
+            </a:xfrm>
+            <a:prstGeom prst="rect">
+              <a:avLst/>
+            </a:prstGeom>
+            <a:noFill/>
+          </p:spPr>
+          <p:txBody>
+            <a:bodyPr wrap="none" rtlCol="0">
+              <a:spAutoFit/>
+            </a:bodyPr>
+            <a:lstStyle/>
+            <a:p>
+              <a:pPr algn="ctr"/>
+              <a:r>
+                <a:rPr lang="en-US" sz="3200" dirty="0">
+                  <a:solidFill>
+                    <a:srgbClr val="FF0000"/>
+                  </a:solidFill>
+                  <a:sym typeface="Wingdings"/>
+                </a:rPr>
+                <a:t></a:t>
+              </a:r>
+              <a:endParaRPr lang="en-US" sz="3200" dirty="0">
                 <a:solidFill>
                   <a:srgbClr val="FF0000"/>
                 </a:solidFill>
-                <a:sym typeface="Wingdings"/>
-              </a:rPr>
-              <a:t></a:t>
-            </a:r>
-            <a:endParaRPr lang="en-US" sz="3200" dirty="0">
-              <a:solidFill>
-                <a:srgbClr val="FF0000"/>
-              </a:solidFill>
-            </a:endParaRPr>
-          </a:p>
-        </p:txBody>
-      </p:sp>
-      <p:sp>
-        <p:nvSpPr>
-          <p:cNvPr id="12" name="TextBox 11"/>
-          <p:cNvSpPr txBox="1"/>
+              </a:endParaRPr>
+            </a:p>
+          </p:txBody>
+        </p:sp>
+      </p:grpSp>
+      <p:grpSp>
+        <p:nvGrpSpPr>
+          <p:cNvPr id="10" name="Group 9">
+            <a:extLst>
+              <a:ext uri="{FF2B5EF4-FFF2-40B4-BE49-F238E27FC236}">
+                <a16:creationId xmlns:a16="http://schemas.microsoft.com/office/drawing/2014/main" id="{81BF7494-A954-414E-9DBB-08931A666896}"/>
+              </a:ext>
+            </a:extLst>
+          </p:cNvPr>
+          <p:cNvGrpSpPr/>
           <p:nvPr/>
-        </p:nvSpPr>
-        <p:spPr>
+        </p:nvGrpSpPr>
+        <p:grpSpPr>
           <a:xfrm>
-            <a:off x="8357165" y="2544880"/>
-            <a:ext cx="506870" cy="584775"/>
+            <a:off x="4724400" y="1828800"/>
+            <a:ext cx="4139635" cy="1384995"/>
+            <a:chOff x="4724400" y="1828800"/>
+            <a:chExt cx="4139635" cy="1384995"/>
           </a:xfrm>
-          <a:prstGeom prst="rect">
-            <a:avLst/>
-          </a:prstGeom>
-          <a:noFill/>
-        </p:spPr>
-        <p:txBody>
-          <a:bodyPr wrap="none" rtlCol="0">
-            <a:spAutoFit/>
-          </a:bodyPr>
-          <a:lstStyle/>
-          <a:p>
-            <a:pPr algn="ctr"/>
-            <a:r>
-              <a:rPr lang="en-US" sz="3200" dirty="0">
-                <a:solidFill>
-                  <a:srgbClr val="00B050"/>
-                </a:solidFill>
-                <a:sym typeface="Wingdings"/>
-              </a:rPr>
-              <a:t></a:t>
-            </a:r>
-            <a:endParaRPr lang="en-US" sz="3200" dirty="0"/>
-          </a:p>
-        </p:txBody>
-      </p:sp>
+        </p:grpSpPr>
+        <p:sp>
+          <p:nvSpPr>
+            <p:cNvPr id="6" name="TextBox 5"/>
+            <p:cNvSpPr txBox="1"/>
+            <p:nvPr/>
+          </p:nvSpPr>
+          <p:spPr>
+            <a:xfrm>
+              <a:off x="4724400" y="1828800"/>
+              <a:ext cx="3886200" cy="1384995"/>
+            </a:xfrm>
+            <a:prstGeom prst="rect">
+              <a:avLst/>
+            </a:prstGeom>
+            <a:solidFill>
+              <a:srgbClr val="FFFF00">
+                <a:alpha val="10000"/>
+              </a:srgbClr>
+            </a:solidFill>
+          </p:spPr>
+          <p:txBody>
+            <a:bodyPr wrap="square" rtlCol="0">
+              <a:spAutoFit/>
+            </a:bodyPr>
+            <a:lstStyle/>
+            <a:p>
+              <a:r>
+                <a:rPr lang="en-US" sz="1200" dirty="0">
+                  <a:latin typeface="Lucida Sans Typewriter" pitchFamily="49" charset="0"/>
+                </a:rPr>
+                <a:t>&gt; </a:t>
+              </a:r>
+              <a:r>
+                <a:rPr lang="en-US" sz="1200" dirty="0" err="1">
+                  <a:latin typeface="Lucida Sans Typewriter" pitchFamily="49" charset="0"/>
+                </a:rPr>
+                <a:t>Anova</a:t>
+              </a:r>
+              <a:r>
+                <a:rPr lang="en-US" sz="1200" dirty="0">
+                  <a:latin typeface="Lucida Sans Typewriter" pitchFamily="49" charset="0"/>
+                </a:rPr>
+                <a:t>(lm(WP ~ group, data=</a:t>
+              </a:r>
+              <a:r>
+                <a:rPr lang="en-US" sz="1200" dirty="0" err="1">
+                  <a:latin typeface="Lucida Sans Typewriter" pitchFamily="49" charset="0"/>
+                </a:rPr>
+                <a:t>mathscore</a:t>
+              </a:r>
+              <a:r>
+                <a:rPr lang="en-US" sz="1200" dirty="0">
+                  <a:latin typeface="Lucida Sans Typewriter" pitchFamily="49" charset="0"/>
+                </a:rPr>
+                <a:t>))</a:t>
+              </a:r>
+            </a:p>
+            <a:p>
+              <a:r>
+                <a:rPr lang="en-US" sz="1200" dirty="0" err="1">
+                  <a:latin typeface="Lucida Sans Typewriter" pitchFamily="49" charset="0"/>
+                </a:rPr>
+                <a:t>Anova</a:t>
+              </a:r>
+              <a:r>
+                <a:rPr lang="en-US" sz="1200" dirty="0">
+                  <a:latin typeface="Lucida Sans Typewriter" pitchFamily="49" charset="0"/>
+                </a:rPr>
+                <a:t> Table (Type II tests)</a:t>
+              </a:r>
+            </a:p>
+            <a:p>
+              <a:endParaRPr lang="en-US" sz="1200" dirty="0">
+                <a:latin typeface="Lucida Sans Typewriter" pitchFamily="49" charset="0"/>
+              </a:endParaRPr>
+            </a:p>
+            <a:p>
+              <a:r>
+                <a:rPr lang="en-US" sz="1200" dirty="0">
+                  <a:latin typeface="Lucida Sans Typewriter" pitchFamily="49" charset="0"/>
+                </a:rPr>
+                <a:t>Response: WP</a:t>
+              </a:r>
+            </a:p>
+            <a:p>
+              <a:r>
+                <a:rPr lang="en-US" sz="1200" dirty="0">
+                  <a:latin typeface="Lucida Sans Typewriter" pitchFamily="49" charset="0"/>
+                </a:rPr>
+                <a:t>          Sum </a:t>
+              </a:r>
+              <a:r>
+                <a:rPr lang="en-US" sz="1200" dirty="0" err="1">
+                  <a:latin typeface="Lucida Sans Typewriter" pitchFamily="49" charset="0"/>
+                </a:rPr>
+                <a:t>Sq</a:t>
+              </a:r>
+              <a:r>
+                <a:rPr lang="en-US" sz="1200" dirty="0">
+                  <a:latin typeface="Lucida Sans Typewriter" pitchFamily="49" charset="0"/>
+                </a:rPr>
+                <a:t> </a:t>
+              </a:r>
+              <a:r>
+                <a:rPr lang="en-US" sz="1200" dirty="0" err="1">
+                  <a:latin typeface="Lucida Sans Typewriter" pitchFamily="49" charset="0"/>
+                </a:rPr>
+                <a:t>Df</a:t>
+              </a:r>
+              <a:r>
+                <a:rPr lang="en-US" sz="1200" dirty="0">
+                  <a:latin typeface="Lucida Sans Typewriter" pitchFamily="49" charset="0"/>
+                </a:rPr>
+                <a:t> F value </a:t>
+              </a:r>
+              <a:r>
+                <a:rPr lang="en-US" sz="1200" dirty="0" err="1">
+                  <a:latin typeface="Lucida Sans Typewriter" pitchFamily="49" charset="0"/>
+                </a:rPr>
+                <a:t>Pr</a:t>
+              </a:r>
+              <a:r>
+                <a:rPr lang="en-US" sz="1200" dirty="0">
+                  <a:latin typeface="Lucida Sans Typewriter" pitchFamily="49" charset="0"/>
+                </a:rPr>
+                <a:t>(&gt;F)   </a:t>
+              </a:r>
+            </a:p>
+            <a:p>
+              <a:r>
+                <a:rPr lang="en-US" sz="1200" dirty="0">
+                  <a:latin typeface="Lucida Sans Typewriter" pitchFamily="49" charset="0"/>
+                </a:rPr>
+                <a:t>group       4408  1    10.4  0.009 **</a:t>
+              </a:r>
+            </a:p>
+            <a:p>
+              <a:r>
+                <a:rPr lang="en-US" sz="1200" dirty="0">
+                  <a:latin typeface="Lucida Sans Typewriter" pitchFamily="49" charset="0"/>
+                </a:rPr>
+                <a:t>Residuals   4217 10 </a:t>
+              </a:r>
+            </a:p>
+          </p:txBody>
+        </p:sp>
+        <p:sp>
+          <p:nvSpPr>
+            <p:cNvPr id="12" name="TextBox 11"/>
+            <p:cNvSpPr txBox="1"/>
+            <p:nvPr/>
+          </p:nvSpPr>
+          <p:spPr>
+            <a:xfrm>
+              <a:off x="8357165" y="2544880"/>
+              <a:ext cx="506870" cy="584775"/>
+            </a:xfrm>
+            <a:prstGeom prst="rect">
+              <a:avLst/>
+            </a:prstGeom>
+            <a:noFill/>
+          </p:spPr>
+          <p:txBody>
+            <a:bodyPr wrap="none" rtlCol="0">
+              <a:spAutoFit/>
+            </a:bodyPr>
+            <a:lstStyle/>
+            <a:p>
+              <a:pPr algn="ctr"/>
+              <a:r>
+                <a:rPr lang="en-US" sz="3200" dirty="0">
+                  <a:solidFill>
+                    <a:srgbClr val="00B050"/>
+                  </a:solidFill>
+                  <a:sym typeface="Wingdings"/>
+                </a:rPr>
+                <a:t></a:t>
+              </a:r>
+              <a:endParaRPr lang="en-US" sz="3200" dirty="0"/>
+            </a:p>
+          </p:txBody>
+        </p:sp>
+      </p:grpSp>
     </p:spTree>
     <p:extLst>
       <p:ext uri="{BB962C8B-B14F-4D97-AF65-F5344CB8AC3E}">
@@ -6565,6 +6678,257 @@
   <p:clrMapOvr>
     <a:masterClrMapping/>
   </p:clrMapOvr>
+  <p:timing>
+    <p:tnLst>
+      <p:par>
+        <p:cTn id="1" dur="indefinite" restart="never" nodeType="tmRoot">
+          <p:childTnLst>
+            <p:seq concurrent="1" nextAc="seek">
+              <p:cTn id="2" dur="indefinite" nodeType="mainSeq">
+                <p:childTnLst>
+                  <p:par>
+                    <p:cTn id="3" fill="hold">
+                      <p:stCondLst>
+                        <p:cond delay="indefinite"/>
+                      </p:stCondLst>
+                      <p:childTnLst>
+                        <p:par>
+                          <p:cTn id="4" fill="hold">
+                            <p:stCondLst>
+                              <p:cond delay="0"/>
+                            </p:stCondLst>
+                            <p:childTnLst>
+                              <p:par>
+                                <p:cTn id="5" presetID="1" presetClass="entr" presetSubtype="0" fill="hold" grpId="0" nodeType="clickEffect">
+                                  <p:stCondLst>
+                                    <p:cond delay="0"/>
+                                  </p:stCondLst>
+                                  <p:childTnLst>
+                                    <p:set>
+                                      <p:cBhvr>
+                                        <p:cTn id="6" dur="1" fill="hold">
+                                          <p:stCondLst>
+                                            <p:cond delay="0"/>
+                                          </p:stCondLst>
+                                        </p:cTn>
+                                        <p:tgtEl>
+                                          <p:spTgt spid="7"/>
+                                        </p:tgtEl>
+                                        <p:attrNameLst>
+                                          <p:attrName>style.visibility</p:attrName>
+                                        </p:attrNameLst>
+                                      </p:cBhvr>
+                                      <p:to>
+                                        <p:strVal val="visible"/>
+                                      </p:to>
+                                    </p:set>
+                                  </p:childTnLst>
+                                </p:cTn>
+                              </p:par>
+                            </p:childTnLst>
+                          </p:cTn>
+                        </p:par>
+                      </p:childTnLst>
+                    </p:cTn>
+                  </p:par>
+                  <p:par>
+                    <p:cTn id="7" fill="hold">
+                      <p:stCondLst>
+                        <p:cond delay="indefinite"/>
+                      </p:stCondLst>
+                      <p:childTnLst>
+                        <p:par>
+                          <p:cTn id="8" fill="hold">
+                            <p:stCondLst>
+                              <p:cond delay="0"/>
+                            </p:stCondLst>
+                            <p:childTnLst>
+                              <p:par>
+                                <p:cTn id="9" presetID="1" presetClass="entr" presetSubtype="0" fill="hold" nodeType="clickEffect">
+                                  <p:stCondLst>
+                                    <p:cond delay="0"/>
+                                  </p:stCondLst>
+                                  <p:childTnLst>
+                                    <p:set>
+                                      <p:cBhvr>
+                                        <p:cTn id="10" dur="1" fill="hold">
+                                          <p:stCondLst>
+                                            <p:cond delay="0"/>
+                                          </p:stCondLst>
+                                        </p:cTn>
+                                        <p:tgtEl>
+                                          <p:spTgt spid="8">
+                                            <p:txEl>
+                                              <p:pRg st="0" end="0"/>
+                                            </p:txEl>
+                                          </p:spTgt>
+                                        </p:tgtEl>
+                                        <p:attrNameLst>
+                                          <p:attrName>style.visibility</p:attrName>
+                                        </p:attrNameLst>
+                                      </p:cBhvr>
+                                      <p:to>
+                                        <p:strVal val="visible"/>
+                                      </p:to>
+                                    </p:set>
+                                  </p:childTnLst>
+                                </p:cTn>
+                              </p:par>
+                              <p:par>
+                                <p:cTn id="11" presetID="1" presetClass="entr" presetSubtype="0" fill="hold" nodeType="withEffect">
+                                  <p:stCondLst>
+                                    <p:cond delay="0"/>
+                                  </p:stCondLst>
+                                  <p:childTnLst>
+                                    <p:set>
+                                      <p:cBhvr>
+                                        <p:cTn id="12" dur="1" fill="hold">
+                                          <p:stCondLst>
+                                            <p:cond delay="0"/>
+                                          </p:stCondLst>
+                                        </p:cTn>
+                                        <p:tgtEl>
+                                          <p:spTgt spid="8">
+                                            <p:txEl>
+                                              <p:pRg st="1" end="1"/>
+                                            </p:txEl>
+                                          </p:spTgt>
+                                        </p:tgtEl>
+                                        <p:attrNameLst>
+                                          <p:attrName>style.visibility</p:attrName>
+                                        </p:attrNameLst>
+                                      </p:cBhvr>
+                                      <p:to>
+                                        <p:strVal val="visible"/>
+                                      </p:to>
+                                    </p:set>
+                                  </p:childTnLst>
+                                </p:cTn>
+                              </p:par>
+                              <p:par>
+                                <p:cTn id="13" presetID="1" presetClass="entr" presetSubtype="0" fill="hold" nodeType="withEffect">
+                                  <p:stCondLst>
+                                    <p:cond delay="0"/>
+                                  </p:stCondLst>
+                                  <p:childTnLst>
+                                    <p:set>
+                                      <p:cBhvr>
+                                        <p:cTn id="14" dur="1" fill="hold">
+                                          <p:stCondLst>
+                                            <p:cond delay="0"/>
+                                          </p:stCondLst>
+                                        </p:cTn>
+                                        <p:tgtEl>
+                                          <p:spTgt spid="8">
+                                            <p:txEl>
+                                              <p:pRg st="2" end="2"/>
+                                            </p:txEl>
+                                          </p:spTgt>
+                                        </p:tgtEl>
+                                        <p:attrNameLst>
+                                          <p:attrName>style.visibility</p:attrName>
+                                        </p:attrNameLst>
+                                      </p:cBhvr>
+                                      <p:to>
+                                        <p:strVal val="visible"/>
+                                      </p:to>
+                                    </p:set>
+                                  </p:childTnLst>
+                                </p:cTn>
+                              </p:par>
+                              <p:par>
+                                <p:cTn id="15" presetID="1" presetClass="entr" presetSubtype="0" fill="hold" nodeType="withEffect">
+                                  <p:stCondLst>
+                                    <p:cond delay="0"/>
+                                  </p:stCondLst>
+                                  <p:childTnLst>
+                                    <p:set>
+                                      <p:cBhvr>
+                                        <p:cTn id="16" dur="1" fill="hold">
+                                          <p:stCondLst>
+                                            <p:cond delay="0"/>
+                                          </p:stCondLst>
+                                        </p:cTn>
+                                        <p:tgtEl>
+                                          <p:spTgt spid="8">
+                                            <p:txEl>
+                                              <p:pRg st="3" end="3"/>
+                                            </p:txEl>
+                                          </p:spTgt>
+                                        </p:tgtEl>
+                                        <p:attrNameLst>
+                                          <p:attrName>style.visibility</p:attrName>
+                                        </p:attrNameLst>
+                                      </p:cBhvr>
+                                      <p:to>
+                                        <p:strVal val="visible"/>
+                                      </p:to>
+                                    </p:set>
+                                  </p:childTnLst>
+                                </p:cTn>
+                              </p:par>
+                              <p:par>
+                                <p:cTn id="17" presetID="1" presetClass="entr" presetSubtype="0" fill="hold" nodeType="withEffect">
+                                  <p:stCondLst>
+                                    <p:cond delay="0"/>
+                                  </p:stCondLst>
+                                  <p:childTnLst>
+                                    <p:set>
+                                      <p:cBhvr>
+                                        <p:cTn id="18" dur="1" fill="hold">
+                                          <p:stCondLst>
+                                            <p:cond delay="0"/>
+                                          </p:stCondLst>
+                                        </p:cTn>
+                                        <p:tgtEl>
+                                          <p:spTgt spid="8">
+                                            <p:txEl>
+                                              <p:pRg st="4" end="4"/>
+                                            </p:txEl>
+                                          </p:spTgt>
+                                        </p:tgtEl>
+                                        <p:attrNameLst>
+                                          <p:attrName>style.visibility</p:attrName>
+                                        </p:attrNameLst>
+                                      </p:cBhvr>
+                                      <p:to>
+                                        <p:strVal val="visible"/>
+                                      </p:to>
+                                    </p:set>
+                                  </p:childTnLst>
+                                </p:cTn>
+                              </p:par>
+                            </p:childTnLst>
+                          </p:cTn>
+                        </p:par>
+                      </p:childTnLst>
+                    </p:cTn>
+                  </p:par>
+                </p:childTnLst>
+              </p:cTn>
+              <p:prevCondLst>
+                <p:cond evt="onPrev" delay="0">
+                  <p:tgtEl>
+                    <p:sldTgt/>
+                  </p:tgtEl>
+                </p:cond>
+              </p:prevCondLst>
+              <p:nextCondLst>
+                <p:cond evt="onNext" delay="0">
+                  <p:tgtEl>
+                    <p:sldTgt/>
+                  </p:tgtEl>
+                </p:cond>
+              </p:nextCondLst>
+            </p:seq>
+          </p:childTnLst>
+        </p:cTn>
+      </p:par>
+    </p:tnLst>
+    <p:bldLst>
+      <p:bldP spid="7" grpId="0"/>
+    </p:bldLst>
+  </p:timing>
 </p:sld>
 </file>
 
@@ -7290,7 +7654,7 @@
           <a:graphicData uri="http://schemas.openxmlformats.org/presentationml/2006/ole">
             <mc:AlternateContent xmlns:mc="http://schemas.openxmlformats.org/markup-compatibility/2006">
               <mc:Choice xmlns:v="urn:schemas-microsoft-com:vml" Requires="v">
-                <p:oleObj spid="_x0000_s4232" name="Equation" r:id="rId5" imgW="393480" imgH="203040" progId="Equation.DSMT4">
+                <p:oleObj spid="_x0000_s4240" name="Equation" r:id="rId5" imgW="393480" imgH="203040" progId="Equation.DSMT4">
                   <p:embed/>
                 </p:oleObj>
               </mc:Choice>
@@ -7347,7 +7711,7 @@
           <a:graphicData uri="http://schemas.openxmlformats.org/presentationml/2006/ole">
             <mc:AlternateContent xmlns:mc="http://schemas.openxmlformats.org/markup-compatibility/2006">
               <mc:Choice xmlns:v="urn:schemas-microsoft-com:vml" Requires="v">
-                <p:oleObj spid="_x0000_s4233" name="Equation" r:id="rId7" imgW="355320" imgH="203040" progId="Equation.DSMT4">
+                <p:oleObj spid="_x0000_s4241" name="Equation" r:id="rId7" imgW="355320" imgH="203040" progId="Equation.DSMT4">
                   <p:embed/>
                 </p:oleObj>
               </mc:Choice>
@@ -8972,7 +9336,7 @@
           <a:graphicData uri="http://schemas.openxmlformats.org/presentationml/2006/ole">
             <mc:AlternateContent xmlns:mc="http://schemas.openxmlformats.org/markup-compatibility/2006">
               <mc:Choice xmlns:v="urn:schemas-microsoft-com:vml" Requires="v">
-                <p:oleObj spid="_x0000_s5177" name="Equation" r:id="rId5" imgW="1104840" imgH="304560" progId="Equation.DSMT4">
+                <p:oleObj spid="_x0000_s5181" name="Equation" r:id="rId5" imgW="1104840" imgH="304560" progId="Equation.DSMT4">
                   <p:embed/>
                 </p:oleObj>
               </mc:Choice>
@@ -9474,7 +9838,7 @@
           <a:graphicData uri="http://schemas.openxmlformats.org/presentationml/2006/ole">
             <mc:AlternateContent xmlns:mc="http://schemas.openxmlformats.org/markup-compatibility/2006">
               <mc:Choice xmlns:v="urn:schemas-microsoft-com:vml" Requires="v">
-                <p:oleObj spid="_x0000_s11303" name="Equation" r:id="rId9" imgW="1231560" imgH="291960" progId="Equation.DSMT4">
+                <p:oleObj spid="_x0000_s11308" name="Equation" r:id="rId9" imgW="1231560" imgH="291960" progId="Equation.DSMT4">
                   <p:embed/>
                 </p:oleObj>
               </mc:Choice>
@@ -10115,33 +10479,15 @@
                                   </p:childTnLst>
                                 </p:cTn>
                               </p:par>
-                            </p:childTnLst>
-                          </p:cTn>
-                        </p:par>
-                      </p:childTnLst>
-                    </p:cTn>
-                  </p:par>
-                  <p:par>
-                    <p:cTn id="41" fill="hold">
-                      <p:stCondLst>
-                        <p:cond delay="indefinite"/>
-                      </p:stCondLst>
-                      <p:childTnLst>
-                        <p:par>
-                          <p:cTn id="42" fill="hold">
-                            <p:stCondLst>
-                              <p:cond delay="0"/>
-                            </p:stCondLst>
-                            <p:childTnLst>
                               <p:par>
-                                <p:cTn id="43" presetID="2" presetClass="entr" presetSubtype="8" fill="hold" nodeType="clickEffect">
+                                <p:cTn id="41" presetID="2" presetClass="entr" presetSubtype="8" fill="hold" nodeType="withEffect">
                                   <p:stCondLst>
                                     <p:cond delay="0"/>
                                   </p:stCondLst>
                                   <p:childTnLst>
                                     <p:set>
                                       <p:cBhvr>
-                                        <p:cTn id="44" dur="1" fill="hold">
+                                        <p:cTn id="42" dur="1" fill="hold">
                                           <p:stCondLst>
                                             <p:cond delay="0"/>
                                           </p:stCondLst>
@@ -10159,7 +10505,7 @@
                                     </p:set>
                                     <p:anim calcmode="lin" valueType="num">
                                       <p:cBhvr additive="base">
-                                        <p:cTn id="45" dur="500" fill="hold"/>
+                                        <p:cTn id="43" dur="500" fill="hold"/>
                                         <p:tgtEl>
                                           <p:spTgt spid="23"/>
                                         </p:tgtEl>
@@ -10182,7 +10528,7 @@
                                     </p:anim>
                                     <p:anim calcmode="lin" valueType="num">
                                       <p:cBhvr additive="base">
-                                        <p:cTn id="46" dur="500" fill="hold"/>
+                                        <p:cTn id="44" dur="500" fill="hold"/>
                                         <p:tgtEl>
                                           <p:spTgt spid="23"/>
                                         </p:tgtEl>
@@ -10207,14 +10553,14 @@
                                 </p:cTn>
                               </p:par>
                               <p:par>
-                                <p:cTn id="47" presetID="2" presetClass="entr" presetSubtype="2" fill="hold" nodeType="withEffect">
+                                <p:cTn id="45" presetID="2" presetClass="entr" presetSubtype="2" fill="hold" nodeType="withEffect">
                                   <p:stCondLst>
                                     <p:cond delay="0"/>
                                   </p:stCondLst>
                                   <p:childTnLst>
                                     <p:set>
                                       <p:cBhvr>
-                                        <p:cTn id="48" dur="1" fill="hold">
+                                        <p:cTn id="46" dur="1" fill="hold">
                                           <p:stCondLst>
                                             <p:cond delay="0"/>
                                           </p:stCondLst>
@@ -10232,7 +10578,7 @@
                                     </p:set>
                                     <p:anim calcmode="lin" valueType="num">
                                       <p:cBhvr additive="base">
-                                        <p:cTn id="49" dur="500" fill="hold"/>
+                                        <p:cTn id="47" dur="500" fill="hold"/>
                                         <p:tgtEl>
                                           <p:spTgt spid="21"/>
                                         </p:tgtEl>
@@ -10255,7 +10601,7 @@
                                     </p:anim>
                                     <p:anim calcmode="lin" valueType="num">
                                       <p:cBhvr additive="base">
-                                        <p:cTn id="50" dur="500" fill="hold"/>
+                                        <p:cTn id="48" dur="500" fill="hold"/>
                                         <p:tgtEl>
                                           <p:spTgt spid="21"/>
                                         </p:tgtEl>
@@ -10280,14 +10626,14 @@
                                 </p:cTn>
                               </p:par>
                               <p:par>
-                                <p:cTn id="51" presetID="2" presetClass="entr" presetSubtype="2" fill="hold" nodeType="withEffect">
+                                <p:cTn id="49" presetID="2" presetClass="entr" presetSubtype="2" fill="hold" nodeType="withEffect">
                                   <p:stCondLst>
                                     <p:cond delay="0"/>
                                   </p:stCondLst>
                                   <p:childTnLst>
                                     <p:set>
                                       <p:cBhvr>
-                                        <p:cTn id="52" dur="1" fill="hold">
+                                        <p:cTn id="50" dur="1" fill="hold">
                                           <p:stCondLst>
                                             <p:cond delay="0"/>
                                           </p:stCondLst>
@@ -10305,7 +10651,7 @@
                                     </p:set>
                                     <p:anim calcmode="lin" valueType="num">
                                       <p:cBhvr additive="base">
-                                        <p:cTn id="53" dur="500" fill="hold"/>
+                                        <p:cTn id="51" dur="500" fill="hold"/>
                                         <p:tgtEl>
                                           <p:spTgt spid="22"/>
                                         </p:tgtEl>
@@ -10328,7 +10674,7 @@
                                     </p:anim>
                                     <p:anim calcmode="lin" valueType="num">
                                       <p:cBhvr additive="base">
-                                        <p:cTn id="54" dur="500" fill="hold"/>
+                                        <p:cTn id="52" dur="500" fill="hold"/>
                                         <p:tgtEl>
                                           <p:spTgt spid="22"/>
                                         </p:tgtEl>
@@ -10692,7 +11038,7 @@
           <a:graphicData uri="http://schemas.openxmlformats.org/presentationml/2006/ole">
             <mc:AlternateContent xmlns:mc="http://schemas.openxmlformats.org/markup-compatibility/2006">
               <mc:Choice xmlns:v="urn:schemas-microsoft-com:vml" Requires="v">
-                <p:oleObj spid="_x0000_s7224" name="Equation" r:id="rId6" imgW="1676160" imgH="304560" progId="Equation.DSMT4">
+                <p:oleObj spid="_x0000_s7228" name="Equation" r:id="rId6" imgW="1676160" imgH="304560" progId="Equation.DSMT4">
                   <p:embed/>
                 </p:oleObj>
               </mc:Choice>
@@ -11271,7 +11617,7 @@
           <a:graphicData uri="http://schemas.openxmlformats.org/presentationml/2006/ole">
             <mc:AlternateContent xmlns:mc="http://schemas.openxmlformats.org/markup-compatibility/2006">
               <mc:Choice xmlns:v="urn:schemas-microsoft-com:vml" Requires="v">
-                <p:oleObj spid="_x0000_s6203" name="Equation" r:id="rId3" imgW="1104840" imgH="304560" progId="Equation.DSMT4">
+                <p:oleObj spid="_x0000_s6207" name="Equation" r:id="rId3" imgW="1104840" imgH="304560" progId="Equation.DSMT4">
                   <p:embed/>
                 </p:oleObj>
               </mc:Choice>
@@ -11951,7 +12297,7 @@
           <a:graphicData uri="http://schemas.openxmlformats.org/presentationml/2006/ole">
             <mc:AlternateContent xmlns:mc="http://schemas.openxmlformats.org/markup-compatibility/2006">
               <mc:Choice xmlns:v="urn:schemas-microsoft-com:vml" Requires="v">
-                <p:oleObj spid="_x0000_s12324" name="Equation" r:id="rId3" imgW="1676160" imgH="304560" progId="Equation.DSMT4">
+                <p:oleObj spid="_x0000_s12328" name="Equation" r:id="rId3" imgW="1676160" imgH="304560" progId="Equation.DSMT4">
                   <p:embed/>
                 </p:oleObj>
               </mc:Choice>
@@ -14455,7 +14801,7 @@
         </p:blipFill>
         <p:spPr bwMode="auto">
           <a:xfrm>
-            <a:off x="381000" y="2057400"/>
+            <a:off x="415925" y="2057400"/>
             <a:ext cx="6594475" cy="4117978"/>
           </a:xfrm>
           <a:prstGeom prst="rect">
@@ -14507,7 +14853,7 @@
                   <a:srgbClr val="FF0000"/>
                 </a:solidFill>
               </a:rPr>
-              <a:t>How do means differ?</a:t>
+              <a:t>Do means differ?</a:t>
             </a:r>
           </a:p>
           <a:p>
@@ -14625,6 +14971,75 @@
           </a:fontRef>
         </p:style>
       </p:cxnSp>
+      <p:sp>
+        <p:nvSpPr>
+          <p:cNvPr id="6" name="TextBox 5">
+            <a:extLst>
+              <a:ext uri="{FF2B5EF4-FFF2-40B4-BE49-F238E27FC236}">
+                <a16:creationId xmlns:a16="http://schemas.microsoft.com/office/drawing/2014/main" id="{4343E5EF-D9DD-4A75-99CB-B2C14A929B9E}"/>
+              </a:ext>
+            </a:extLst>
+          </p:cNvPr>
+          <p:cNvSpPr txBox="1"/>
+          <p:nvPr/>
+        </p:nvSpPr>
+        <p:spPr>
+          <a:xfrm>
+            <a:off x="378595" y="1524000"/>
+            <a:ext cx="1295400" cy="338554"/>
+          </a:xfrm>
+          <a:prstGeom prst="rect">
+            <a:avLst/>
+          </a:prstGeom>
+          <a:noFill/>
+        </p:spPr>
+        <p:txBody>
+          <a:bodyPr wrap="square" rtlCol="0">
+            <a:spAutoFit/>
+          </a:bodyPr>
+          <a:lstStyle/>
+          <a:p>
+            <a:r>
+              <a:rPr lang="en-US" sz="1600" dirty="0"/>
+              <a:t>ANOVA</a:t>
+            </a:r>
+          </a:p>
+        </p:txBody>
+      </p:sp>
+      <p:sp>
+        <p:nvSpPr>
+          <p:cNvPr id="8" name="Rectangle 7">
+            <a:extLst>
+              <a:ext uri="{FF2B5EF4-FFF2-40B4-BE49-F238E27FC236}">
+                <a16:creationId xmlns:a16="http://schemas.microsoft.com/office/drawing/2014/main" id="{2C043C1E-E11A-4713-AB18-4F26AA502DE9}"/>
+              </a:ext>
+            </a:extLst>
+          </p:cNvPr>
+          <p:cNvSpPr/>
+          <p:nvPr/>
+        </p:nvSpPr>
+        <p:spPr>
+          <a:xfrm>
+            <a:off x="378595" y="3810000"/>
+            <a:ext cx="1069205" cy="338554"/>
+          </a:xfrm>
+          <a:prstGeom prst="rect">
+            <a:avLst/>
+          </a:prstGeom>
+        </p:spPr>
+        <p:txBody>
+          <a:bodyPr wrap="square">
+            <a:spAutoFit/>
+          </a:bodyPr>
+          <a:lstStyle/>
+          <a:p>
+            <a:r>
+              <a:rPr lang="en-US" sz="1600" dirty="0"/>
+              <a:t>MANOVA</a:t>
+            </a:r>
+          </a:p>
+        </p:txBody>
+      </p:sp>
     </p:spTree>
     <p:extLst>
       <p:ext uri="{BB962C8B-B14F-4D97-AF65-F5344CB8AC3E}">
@@ -22126,7 +22541,7 @@
             <a:graphicData uri="http://schemas.openxmlformats.org/presentationml/2006/ole">
               <mc:AlternateContent xmlns:mc="http://schemas.openxmlformats.org/markup-compatibility/2006">
                 <mc:Choice xmlns:v="urn:schemas-microsoft-com:vml" Requires="v">
-                  <p:oleObj spid="_x0000_s14507" name="Equation" r:id="rId3" imgW="203040" imgH="253800" progId="Equation.DSMT4">
+                  <p:oleObj spid="_x0000_s14555" name="Equation" r:id="rId3" imgW="203040" imgH="253800" progId="Equation.DSMT4">
                     <p:embed/>
                   </p:oleObj>
                 </mc:Choice>
@@ -22500,7 +22915,7 @@
               <a:graphicData uri="http://schemas.openxmlformats.org/presentationml/2006/ole">
                 <mc:AlternateContent xmlns:mc="http://schemas.openxmlformats.org/markup-compatibility/2006">
                   <mc:Choice xmlns:v="urn:schemas-microsoft-com:vml" Requires="v">
-                    <p:oleObj spid="_x0000_s14508" name="Equation" r:id="rId5" imgW="190440" imgH="228600" progId="Equation.DSMT4">
+                    <p:oleObj spid="_x0000_s14556" name="Equation" r:id="rId5" imgW="190440" imgH="228600" progId="Equation.DSMT4">
                       <p:embed/>
                     </p:oleObj>
                   </mc:Choice>
@@ -22563,7 +22978,7 @@
               <a:graphicData uri="http://schemas.openxmlformats.org/presentationml/2006/ole">
                 <mc:AlternateContent xmlns:mc="http://schemas.openxmlformats.org/markup-compatibility/2006">
                   <mc:Choice xmlns:v="urn:schemas-microsoft-com:vml" Requires="v">
-                    <p:oleObj spid="_x0000_s14509" name="Equation" r:id="rId7" imgW="241200" imgH="253800" progId="Equation.DSMT4">
+                    <p:oleObj spid="_x0000_s14557" name="Equation" r:id="rId7" imgW="241200" imgH="253800" progId="Equation.DSMT4">
                       <p:embed/>
                     </p:oleObj>
                   </mc:Choice>
@@ -22646,7 +23061,7 @@
                 <a:graphicData uri="http://schemas.openxmlformats.org/presentationml/2006/ole">
                   <mc:AlternateContent xmlns:mc="http://schemas.openxmlformats.org/markup-compatibility/2006">
                     <mc:Choice xmlns:v="urn:schemas-microsoft-com:vml" Requires="v">
-                      <p:oleObj spid="_x0000_s14510" name="Equation" r:id="rId9" imgW="596880" imgH="241200" progId="Equation.DSMT4">
+                      <p:oleObj spid="_x0000_s14558" name="Equation" r:id="rId9" imgW="596880" imgH="241200" progId="Equation.DSMT4">
                         <p:embed/>
                       </p:oleObj>
                     </mc:Choice>
@@ -22772,7 +23187,7 @@
                 <a:graphicData uri="http://schemas.openxmlformats.org/presentationml/2006/ole">
                   <mc:AlternateContent xmlns:mc="http://schemas.openxmlformats.org/markup-compatibility/2006">
                     <mc:Choice xmlns:v="urn:schemas-microsoft-com:vml" Requires="v">
-                      <p:oleObj spid="_x0000_s14511" name="Equation" r:id="rId11" imgW="622080" imgH="241200" progId="Equation.DSMT4">
+                      <p:oleObj spid="_x0000_s14559" name="Equation" r:id="rId11" imgW="622080" imgH="241200" progId="Equation.DSMT4">
                         <p:embed/>
                       </p:oleObj>
                     </mc:Choice>
@@ -22898,7 +23313,7 @@
                 <a:graphicData uri="http://schemas.openxmlformats.org/presentationml/2006/ole">
                   <mc:AlternateContent xmlns:mc="http://schemas.openxmlformats.org/markup-compatibility/2006">
                     <mc:Choice xmlns:v="urn:schemas-microsoft-com:vml" Requires="v">
-                      <p:oleObj spid="_x0000_s14512" name="Equation" r:id="rId13" imgW="609480" imgH="241200" progId="Equation.DSMT4">
+                      <p:oleObj spid="_x0000_s14560" name="Equation" r:id="rId13" imgW="609480" imgH="241200" progId="Equation.DSMT4">
                         <p:embed/>
                       </p:oleObj>
                     </mc:Choice>
@@ -23026,7 +23441,7 @@
             <a:graphicData uri="http://schemas.openxmlformats.org/presentationml/2006/ole">
               <mc:AlternateContent xmlns:mc="http://schemas.openxmlformats.org/markup-compatibility/2006">
                 <mc:Choice xmlns:v="urn:schemas-microsoft-com:vml" Requires="v">
-                  <p:oleObj spid="_x0000_s14513" name="Equation" r:id="rId15" imgW="203040" imgH="253800" progId="Equation.DSMT4">
+                  <p:oleObj spid="_x0000_s14561" name="Equation" r:id="rId15" imgW="203040" imgH="253800" progId="Equation.DSMT4">
                     <p:embed/>
                   </p:oleObj>
                 </mc:Choice>
@@ -23386,7 +23801,7 @@
             <a:graphicData uri="http://schemas.openxmlformats.org/presentationml/2006/ole">
               <mc:AlternateContent xmlns:mc="http://schemas.openxmlformats.org/markup-compatibility/2006">
                 <mc:Choice xmlns:v="urn:schemas-microsoft-com:vml" Requires="v">
-                  <p:oleObj spid="_x0000_s14514" name="Equation" r:id="rId16" imgW="190440" imgH="228600" progId="Equation.DSMT4">
+                  <p:oleObj spid="_x0000_s14562" name="Equation" r:id="rId16" imgW="190440" imgH="228600" progId="Equation.DSMT4">
                     <p:embed/>
                   </p:oleObj>
                 </mc:Choice>
@@ -23455,7 +23870,7 @@
             <a:graphicData uri="http://schemas.openxmlformats.org/presentationml/2006/ole">
               <mc:AlternateContent xmlns:mc="http://schemas.openxmlformats.org/markup-compatibility/2006">
                 <mc:Choice xmlns:v="urn:schemas-microsoft-com:vml" Requires="v">
-                  <p:oleObj spid="_x0000_s14515" name="Equation" r:id="rId17" imgW="241200" imgH="253800" progId="Equation.DSMT4">
+                  <p:oleObj spid="_x0000_s14563" name="Equation" r:id="rId17" imgW="241200" imgH="253800" progId="Equation.DSMT4">
                     <p:embed/>
                   </p:oleObj>
                 </mc:Choice>
@@ -23544,7 +23959,7 @@
               <a:graphicData uri="http://schemas.openxmlformats.org/presentationml/2006/ole">
                 <mc:AlternateContent xmlns:mc="http://schemas.openxmlformats.org/markup-compatibility/2006">
                   <mc:Choice xmlns:v="urn:schemas-microsoft-com:vml" Requires="v">
-                    <p:oleObj spid="_x0000_s14516" name="Equation" r:id="rId18" imgW="596880" imgH="241200" progId="Equation.DSMT4">
+                    <p:oleObj spid="_x0000_s14564" name="Equation" r:id="rId18" imgW="596880" imgH="241200" progId="Equation.DSMT4">
                       <p:embed/>
                     </p:oleObj>
                   </mc:Choice>
@@ -23670,7 +24085,7 @@
               <a:graphicData uri="http://schemas.openxmlformats.org/presentationml/2006/ole">
                 <mc:AlternateContent xmlns:mc="http://schemas.openxmlformats.org/markup-compatibility/2006">
                   <mc:Choice xmlns:v="urn:schemas-microsoft-com:vml" Requires="v">
-                    <p:oleObj spid="_x0000_s14517" name="Equation" r:id="rId19" imgW="622080" imgH="241200" progId="Equation.DSMT4">
+                    <p:oleObj spid="_x0000_s14565" name="Equation" r:id="rId19" imgW="622080" imgH="241200" progId="Equation.DSMT4">
                       <p:embed/>
                     </p:oleObj>
                   </mc:Choice>
@@ -23796,7 +24211,7 @@
               <a:graphicData uri="http://schemas.openxmlformats.org/presentationml/2006/ole">
                 <mc:AlternateContent xmlns:mc="http://schemas.openxmlformats.org/markup-compatibility/2006">
                   <mc:Choice xmlns:v="urn:schemas-microsoft-com:vml" Requires="v">
-                    <p:oleObj spid="_x0000_s14518" name="Equation" r:id="rId20" imgW="609480" imgH="241200" progId="Equation.DSMT4">
+                    <p:oleObj spid="_x0000_s14566" name="Equation" r:id="rId20" imgW="609480" imgH="241200" progId="Equation.DSMT4">
                       <p:embed/>
                     </p:oleObj>
                   </mc:Choice>
@@ -24024,7 +24439,7 @@
           <a:graphicData uri="http://schemas.openxmlformats.org/presentationml/2006/ole">
             <mc:AlternateContent xmlns:mc="http://schemas.openxmlformats.org/markup-compatibility/2006">
               <mc:Choice xmlns:v="urn:schemas-microsoft-com:vml" Requires="v">
-                <p:oleObj spid="_x0000_s1307" name="Equation" r:id="rId3" imgW="1143000" imgH="330120" progId="Equation.DSMT4">
+                <p:oleObj spid="_x0000_s1330" name="Equation" r:id="rId3" imgW="1143000" imgH="330120" progId="Equation.DSMT4">
                   <p:embed/>
                 </p:oleObj>
               </mc:Choice>
@@ -24081,7 +24496,7 @@
           <a:graphicData uri="http://schemas.openxmlformats.org/presentationml/2006/ole">
             <mc:AlternateContent xmlns:mc="http://schemas.openxmlformats.org/markup-compatibility/2006">
               <mc:Choice xmlns:v="urn:schemas-microsoft-com:vml" Requires="v">
-                <p:oleObj spid="_x0000_s1308" name="Equation" r:id="rId5" imgW="1244520" imgH="291960" progId="Equation.DSMT4">
+                <p:oleObj spid="_x0000_s1331" name="Equation" r:id="rId5" imgW="1244520" imgH="291960" progId="Equation.DSMT4">
                   <p:embed/>
                 </p:oleObj>
               </mc:Choice>
@@ -24168,7 +24583,7 @@
           <a:graphicData uri="http://schemas.openxmlformats.org/presentationml/2006/ole">
             <mc:AlternateContent xmlns:mc="http://schemas.openxmlformats.org/markup-compatibility/2006">
               <mc:Choice xmlns:v="urn:schemas-microsoft-com:vml" Requires="v">
-                <p:oleObj spid="_x0000_s1309" name="Equation" r:id="rId7" imgW="2286000" imgH="685800" progId="Equation.DSMT4">
+                <p:oleObj spid="_x0000_s1332" name="Equation" r:id="rId7" imgW="2286000" imgH="685800" progId="Equation.DSMT4">
                   <p:embed/>
                 </p:oleObj>
               </mc:Choice>
@@ -24238,7 +24653,7 @@
           <a:graphicData uri="http://schemas.openxmlformats.org/presentationml/2006/ole">
             <mc:AlternateContent xmlns:mc="http://schemas.openxmlformats.org/markup-compatibility/2006">
               <mc:Choice xmlns:v="urn:schemas-microsoft-com:vml" Requires="v">
-                <p:oleObj spid="_x0000_s1310" name="Equation" r:id="rId9" imgW="1396800" imgH="431640" progId="Equation.DSMT4">
+                <p:oleObj spid="_x0000_s1333" name="Equation" r:id="rId9" imgW="1396800" imgH="431640" progId="Equation.DSMT4">
                   <p:embed/>
                 </p:oleObj>
               </mc:Choice>
@@ -24421,6 +24836,69 @@
           </a:p>
         </p:txBody>
       </p:sp>
+      <p:graphicFrame>
+        <p:nvGraphicFramePr>
+          <p:cNvPr id="12" name="Object 11">
+            <a:extLst>
+              <a:ext uri="{FF2B5EF4-FFF2-40B4-BE49-F238E27FC236}">
+                <a16:creationId xmlns:a16="http://schemas.microsoft.com/office/drawing/2014/main" id="{F11881DA-25BE-4E24-A2AA-E940F1CAC8E4}"/>
+              </a:ext>
+            </a:extLst>
+          </p:cNvPr>
+          <p:cNvGraphicFramePr>
+            <a:graphicFrameLocks noChangeAspect="1"/>
+          </p:cNvGraphicFramePr>
+          <p:nvPr>
+            <p:extLst>
+              <p:ext uri="{D42A27DB-BD31-4B8C-83A1-F6EECF244321}">
+                <p14:modId xmlns:p14="http://schemas.microsoft.com/office/powerpoint/2010/main" val="197925437"/>
+              </p:ext>
+            </p:extLst>
+          </p:nvPr>
+        </p:nvGraphicFramePr>
+        <p:xfrm>
+          <a:off x="2476821" y="1890408"/>
+          <a:ext cx="3832574" cy="381096"/>
+        </p:xfrm>
+        <a:graphic>
+          <a:graphicData uri="http://schemas.openxmlformats.org/presentationml/2006/ole">
+            <mc:AlternateContent xmlns:mc="http://schemas.openxmlformats.org/markup-compatibility/2006">
+              <mc:Choice xmlns:v="urn:schemas-microsoft-com:vml" Requires="v">
+                <p:oleObj spid="_x0000_s1334" name="Equation" r:id="rId11" imgW="2425680" imgH="241200" progId="Equation.DSMT4">
+                  <p:embed/>
+                </p:oleObj>
+              </mc:Choice>
+              <mc:Fallback>
+                <p:oleObj name="Equation" r:id="rId11" imgW="2425680" imgH="241200" progId="Equation.DSMT4">
+                  <p:embed/>
+                  <p:pic>
+                    <p:nvPicPr>
+                      <p:cNvPr id="0" name=""/>
+                      <p:cNvPicPr/>
+                      <p:nvPr/>
+                    </p:nvPicPr>
+                    <p:blipFill>
+                      <a:blip r:embed="rId12"/>
+                      <a:stretch>
+                        <a:fillRect/>
+                      </a:stretch>
+                    </p:blipFill>
+                    <p:spPr>
+                      <a:xfrm>
+                        <a:off x="2476821" y="1890408"/>
+                        <a:ext cx="3832574" cy="381096"/>
+                      </a:xfrm>
+                      <a:prstGeom prst="rect">
+                        <a:avLst/>
+                      </a:prstGeom>
+                    </p:spPr>
+                  </p:pic>
+                </p:oleObj>
+              </mc:Fallback>
+            </mc:AlternateContent>
+          </a:graphicData>
+        </a:graphic>
+      </p:graphicFrame>
     </p:spTree>
     <p:extLst>
       <p:ext uri="{BB962C8B-B14F-4D97-AF65-F5344CB8AC3E}">
@@ -24628,7 +25106,7 @@
           <a:graphicData uri="http://schemas.openxmlformats.org/presentationml/2006/ole">
             <mc:AlternateContent xmlns:mc="http://schemas.openxmlformats.org/markup-compatibility/2006">
               <mc:Choice xmlns:v="urn:schemas-microsoft-com:vml" Requires="v">
-                <p:oleObj spid="_x0000_s13395" name="Equation" r:id="rId4" imgW="812520" imgH="253800" progId="Equation.DSMT4">
+                <p:oleObj spid="_x0000_s13407" name="Equation" r:id="rId4" imgW="812520" imgH="253800" progId="Equation.DSMT4">
                   <p:embed/>
                 </p:oleObj>
               </mc:Choice>
@@ -24691,7 +25169,7 @@
           <a:graphicData uri="http://schemas.openxmlformats.org/presentationml/2006/ole">
             <mc:AlternateContent xmlns:mc="http://schemas.openxmlformats.org/markup-compatibility/2006">
               <mc:Choice xmlns:v="urn:schemas-microsoft-com:vml" Requires="v">
-                <p:oleObj spid="_x0000_s13396" name="Equation" r:id="rId6" imgW="838080" imgH="253800" progId="Equation.DSMT4">
+                <p:oleObj spid="_x0000_s13408" name="Equation" r:id="rId6" imgW="838080" imgH="253800" progId="Equation.DSMT4">
                   <p:embed/>
                 </p:oleObj>
               </mc:Choice>
@@ -24754,7 +25232,7 @@
           <a:graphicData uri="http://schemas.openxmlformats.org/presentationml/2006/ole">
             <mc:AlternateContent xmlns:mc="http://schemas.openxmlformats.org/markup-compatibility/2006">
               <mc:Choice xmlns:v="urn:schemas-microsoft-com:vml" Requires="v">
-                <p:oleObj spid="_x0000_s13397" name="Equation" r:id="rId8" imgW="825480" imgH="253800" progId="Equation.DSMT4">
+                <p:oleObj spid="_x0000_s13409" name="Equation" r:id="rId8" imgW="825480" imgH="253800" progId="Equation.DSMT4">
                   <p:embed/>
                 </p:oleObj>
               </mc:Choice>
@@ -25293,7 +25771,7 @@
           <a:graphicData uri="http://schemas.openxmlformats.org/presentationml/2006/ole">
             <mc:AlternateContent xmlns:mc="http://schemas.openxmlformats.org/markup-compatibility/2006">
               <mc:Choice xmlns:v="urn:schemas-microsoft-com:vml" Requires="v">
-                <p:oleObj spid="_x0000_s2310" name="Equation" r:id="rId3" imgW="1231560" imgH="291960" progId="Equation.DSMT4">
+                <p:oleObj spid="_x0000_s2322" name="Equation" r:id="rId3" imgW="1231560" imgH="291960" progId="Equation.DSMT4">
                   <p:embed/>
                 </p:oleObj>
               </mc:Choice>
@@ -25350,7 +25828,7 @@
           <a:graphicData uri="http://schemas.openxmlformats.org/presentationml/2006/ole">
             <mc:AlternateContent xmlns:mc="http://schemas.openxmlformats.org/markup-compatibility/2006">
               <mc:Choice xmlns:v="urn:schemas-microsoft-com:vml" Requires="v">
-                <p:oleObj spid="_x0000_s2311" name="Equation" r:id="rId5" imgW="1282680" imgH="291960" progId="Equation.DSMT4">
+                <p:oleObj spid="_x0000_s2323" name="Equation" r:id="rId5" imgW="1282680" imgH="291960" progId="Equation.DSMT4">
                   <p:embed/>
                 </p:oleObj>
               </mc:Choice>
@@ -25444,7 +25922,7 @@
           <a:graphicData uri="http://schemas.openxmlformats.org/presentationml/2006/ole">
             <mc:AlternateContent xmlns:mc="http://schemas.openxmlformats.org/markup-compatibility/2006">
               <mc:Choice xmlns:v="urn:schemas-microsoft-com:vml" Requires="v">
-                <p:oleObj spid="_x0000_s2312" name="Equation" r:id="rId7" imgW="1854000" imgH="609480" progId="Equation.DSMT4">
+                <p:oleObj spid="_x0000_s2324" name="Equation" r:id="rId7" imgW="1854000" imgH="609480" progId="Equation.DSMT4">
                   <p:embed/>
                 </p:oleObj>
               </mc:Choice>
@@ -26232,7 +26710,7 @@
             <a:graphicData uri="http://schemas.openxmlformats.org/presentationml/2006/ole">
               <mc:AlternateContent xmlns:mc="http://schemas.openxmlformats.org/markup-compatibility/2006">
                 <mc:Choice xmlns:v="urn:schemas-microsoft-com:vml" Requires="v">
-                  <p:oleObj spid="_x0000_s15440" name="Equation" r:id="rId8" imgW="203040" imgH="253800" progId="Equation.DSMT4">
+                  <p:oleObj spid="_x0000_s15464" name="Equation" r:id="rId8" imgW="203040" imgH="253800" progId="Equation.DSMT4">
                     <p:embed/>
                   </p:oleObj>
                 </mc:Choice>
@@ -26592,7 +27070,7 @@
             <a:graphicData uri="http://schemas.openxmlformats.org/presentationml/2006/ole">
               <mc:AlternateContent xmlns:mc="http://schemas.openxmlformats.org/markup-compatibility/2006">
                 <mc:Choice xmlns:v="urn:schemas-microsoft-com:vml" Requires="v">
-                  <p:oleObj spid="_x0000_s15441" name="Equation" r:id="rId10" imgW="190440" imgH="228600" progId="Equation.DSMT4">
+                  <p:oleObj spid="_x0000_s15465" name="Equation" r:id="rId10" imgW="190440" imgH="228600" progId="Equation.DSMT4">
                     <p:embed/>
                   </p:oleObj>
                 </mc:Choice>
@@ -26661,7 +27139,7 @@
             <a:graphicData uri="http://schemas.openxmlformats.org/presentationml/2006/ole">
               <mc:AlternateContent xmlns:mc="http://schemas.openxmlformats.org/markup-compatibility/2006">
                 <mc:Choice xmlns:v="urn:schemas-microsoft-com:vml" Requires="v">
-                  <p:oleObj spid="_x0000_s15442" name="Equation" r:id="rId12" imgW="241200" imgH="253800" progId="Equation.DSMT4">
+                  <p:oleObj spid="_x0000_s15466" name="Equation" r:id="rId12" imgW="241200" imgH="253800" progId="Equation.DSMT4">
                     <p:embed/>
                   </p:oleObj>
                 </mc:Choice>
@@ -26750,7 +27228,7 @@
               <a:graphicData uri="http://schemas.openxmlformats.org/presentationml/2006/ole">
                 <mc:AlternateContent xmlns:mc="http://schemas.openxmlformats.org/markup-compatibility/2006">
                   <mc:Choice xmlns:v="urn:schemas-microsoft-com:vml" Requires="v">
-                    <p:oleObj spid="_x0000_s15443" name="Equation" r:id="rId14" imgW="596880" imgH="241200" progId="Equation.DSMT4">
+                    <p:oleObj spid="_x0000_s15467" name="Equation" r:id="rId14" imgW="596880" imgH="241200" progId="Equation.DSMT4">
                       <p:embed/>
                     </p:oleObj>
                   </mc:Choice>
@@ -26876,7 +27354,7 @@
               <a:graphicData uri="http://schemas.openxmlformats.org/presentationml/2006/ole">
                 <mc:AlternateContent xmlns:mc="http://schemas.openxmlformats.org/markup-compatibility/2006">
                   <mc:Choice xmlns:v="urn:schemas-microsoft-com:vml" Requires="v">
-                    <p:oleObj spid="_x0000_s15444" name="Equation" r:id="rId16" imgW="622080" imgH="241200" progId="Equation.DSMT4">
+                    <p:oleObj spid="_x0000_s15468" name="Equation" r:id="rId16" imgW="622080" imgH="241200" progId="Equation.DSMT4">
                       <p:embed/>
                     </p:oleObj>
                   </mc:Choice>
@@ -27002,7 +27480,7 @@
               <a:graphicData uri="http://schemas.openxmlformats.org/presentationml/2006/ole">
                 <mc:AlternateContent xmlns:mc="http://schemas.openxmlformats.org/markup-compatibility/2006">
                   <mc:Choice xmlns:v="urn:schemas-microsoft-com:vml" Requires="v">
-                    <p:oleObj spid="_x0000_s15445" name="Equation" r:id="rId18" imgW="609480" imgH="241200" progId="Equation.DSMT4">
+                    <p:oleObj spid="_x0000_s15469" name="Equation" r:id="rId18" imgW="609480" imgH="241200" progId="Equation.DSMT4">
                       <p:embed/>
                     </p:oleObj>
                   </mc:Choice>
@@ -27849,7 +28327,7 @@
           <a:graphicData uri="http://schemas.openxmlformats.org/presentationml/2006/ole">
             <mc:AlternateContent xmlns:mc="http://schemas.openxmlformats.org/markup-compatibility/2006">
               <mc:Choice xmlns:v="urn:schemas-microsoft-com:vml" Requires="v">
-                <p:oleObj spid="_x0000_s16408" name="Equation" r:id="rId5" imgW="393480" imgH="203040" progId="Equation.DSMT4">
+                <p:oleObj spid="_x0000_s16416" name="Equation" r:id="rId5" imgW="393480" imgH="203040" progId="Equation.DSMT4">
                   <p:embed/>
                 </p:oleObj>
               </mc:Choice>
@@ -27900,7 +28378,7 @@
           <a:graphicData uri="http://schemas.openxmlformats.org/presentationml/2006/ole">
             <mc:AlternateContent xmlns:mc="http://schemas.openxmlformats.org/markup-compatibility/2006">
               <mc:Choice xmlns:v="urn:schemas-microsoft-com:vml" Requires="v">
-                <p:oleObj spid="_x0000_s16409" name="Equation" r:id="rId7" imgW="355320" imgH="203040" progId="Equation.DSMT4">
+                <p:oleObj spid="_x0000_s16417" name="Equation" r:id="rId7" imgW="355320" imgH="203040" progId="Equation.DSMT4">
                   <p:embed/>
                 </p:oleObj>
               </mc:Choice>

</xml_diff>